<commit_message>
last bit o cleanup
</commit_message>
<xml_diff>
--- a/techtalk/CloudDNS-TechTalk-7-PossibleFutureFeatures.pptx
+++ b/techtalk/CloudDNS-TechTalk-7-PossibleFutureFeatures.pptx
@@ -5,14 +5,13 @@
     <p:sldMasterId id="2147483649" r:id="rId4"/>
   </p:sldMasterIdLst>
   <p:notesMasterIdLst>
-    <p:notesMasterId r:id="rId7"/>
+    <p:notesMasterId r:id="rId6"/>
   </p:notesMasterIdLst>
   <p:handoutMasterIdLst>
-    <p:handoutMasterId r:id="rId8"/>
+    <p:handoutMasterId r:id="rId7"/>
   </p:handoutMasterIdLst>
   <p:sldIdLst>
     <p:sldId id="280" r:id="rId5"/>
-    <p:sldId id="281" r:id="rId6"/>
   </p:sldIdLst>
   <p:sldSz cx="9144000" cy="6858000" type="screen4x3"/>
   <p:notesSz cx="6858000" cy="9144000"/>
@@ -741,211 +740,6 @@
               <a:rPr lang="en-US" smtClean="0"/>
               <a:pPr/>
               <a:t>1</a:t>
-            </a:fld>
-            <a:endParaRPr lang="en-US" dirty="0"/>
-          </a:p>
-        </p:txBody>
-      </p:sp>
-    </p:spTree>
-    <p:extLst>
-      <p:ext uri="{BB962C8B-B14F-4D97-AF65-F5344CB8AC3E}">
-        <p14:creationId xmlns:p14="http://schemas.microsoft.com/office/powerpoint/2010/main" val="662730505"/>
-      </p:ext>
-    </p:extLst>
-  </p:cSld>
-  <p:clrMapOvr>
-    <a:masterClrMapping/>
-  </p:clrMapOvr>
-</p:notes>
-</file>
-
-<file path=ppt/notesSlides/notesSlide2.xml><?xml version="1.0" encoding="utf-8"?>
-<p:notes xmlns:a="http://schemas.openxmlformats.org/drawingml/2006/main" xmlns:r="http://schemas.openxmlformats.org/officeDocument/2006/relationships" xmlns:p="http://schemas.openxmlformats.org/presentationml/2006/main">
-  <p:cSld>
-    <p:spTree>
-      <p:nvGrpSpPr>
-        <p:cNvPr id="1" name=""/>
-        <p:cNvGrpSpPr/>
-        <p:nvPr/>
-      </p:nvGrpSpPr>
-      <p:grpSpPr>
-        <a:xfrm>
-          <a:off x="0" y="0"/>
-          <a:ext cx="0" cy="0"/>
-          <a:chOff x="0" y="0"/>
-          <a:chExt cx="0" cy="0"/>
-        </a:xfrm>
-      </p:grpSpPr>
-      <p:sp>
-        <p:nvSpPr>
-          <p:cNvPr id="2" name="Slide Image Placeholder 1"/>
-          <p:cNvSpPr>
-            <a:spLocks noGrp="1" noRot="1" noChangeAspect="1"/>
-          </p:cNvSpPr>
-          <p:nvPr>
-            <p:ph type="sldImg"/>
-          </p:nvPr>
-        </p:nvSpPr>
-        <p:spPr/>
-      </p:sp>
-      <p:sp>
-        <p:nvSpPr>
-          <p:cNvPr id="3" name="Notes Placeholder 2"/>
-          <p:cNvSpPr>
-            <a:spLocks noGrp="1"/>
-          </p:cNvSpPr>
-          <p:nvPr>
-            <p:ph type="body" idx="1"/>
-          </p:nvPr>
-        </p:nvSpPr>
-        <p:spPr/>
-        <p:txBody>
-          <a:bodyPr/>
-          <a:lstStyle/>
-          <a:p>
-            <a:r>
-              <a:rPr lang="en-US" dirty="0" smtClean="0"/>
-              <a:t>During this presentation we will cover </a:t>
-            </a:r>
-          </a:p>
-          <a:p>
-            <a:endParaRPr lang="en-US" dirty="0" smtClean="0"/>
-          </a:p>
-          <a:p>
-            <a:pPr marL="457200" indent="-457200">
-              <a:buFont typeface="Arial"/>
-              <a:buChar char="•"/>
-            </a:pPr>
-            <a:r>
-              <a:rPr lang="en-US" dirty="0" smtClean="0"/>
-              <a:t>What is Cloud DNS?</a:t>
-            </a:r>
-          </a:p>
-          <a:p>
-            <a:pPr marL="457200" indent="-457200">
-              <a:buFont typeface="Arial"/>
-              <a:buChar char="•"/>
-            </a:pPr>
-            <a:endParaRPr lang="en-US" dirty="0" smtClean="0"/>
-          </a:p>
-          <a:p>
-            <a:pPr marL="457200" indent="-457200">
-              <a:buFont typeface="Arial"/>
-              <a:buChar char="•"/>
-            </a:pPr>
-            <a:r>
-              <a:rPr lang="en-US" dirty="0" smtClean="0"/>
-              <a:t>What new features and benefits are we offering customers?</a:t>
-            </a:r>
-          </a:p>
-          <a:p>
-            <a:pPr marL="457200" indent="-457200">
-              <a:buFont typeface="Arial"/>
-              <a:buChar char="•"/>
-            </a:pPr>
-            <a:endParaRPr lang="en-US" dirty="0" smtClean="0"/>
-          </a:p>
-          <a:p>
-            <a:pPr marL="457200" indent="-457200">
-              <a:buFont typeface="Arial"/>
-              <a:buChar char="•"/>
-            </a:pPr>
-            <a:r>
-              <a:rPr lang="en-US" dirty="0" smtClean="0"/>
-              <a:t>Who is this for?</a:t>
-            </a:r>
-          </a:p>
-          <a:p>
-            <a:pPr marL="457200" indent="-457200">
-              <a:buFont typeface="Arial"/>
-              <a:buChar char="•"/>
-            </a:pPr>
-            <a:endParaRPr lang="en-US" dirty="0" smtClean="0"/>
-          </a:p>
-          <a:p>
-            <a:pPr marL="457200" indent="-457200">
-              <a:buFont typeface="Arial"/>
-              <a:buChar char="•"/>
-            </a:pPr>
-            <a:r>
-              <a:rPr lang="en-US" dirty="0" smtClean="0"/>
-              <a:t>When does it launch?</a:t>
-            </a:r>
-          </a:p>
-          <a:p>
-            <a:pPr marL="457200" indent="-457200">
-              <a:buFont typeface="Arial"/>
-              <a:buChar char="•"/>
-            </a:pPr>
-            <a:endParaRPr lang="en-US" dirty="0" smtClean="0"/>
-          </a:p>
-          <a:p>
-            <a:pPr marL="457200" indent="-457200">
-              <a:buFont typeface="Arial"/>
-              <a:buChar char="•"/>
-            </a:pPr>
-            <a:r>
-              <a:rPr lang="en-US" dirty="0" smtClean="0"/>
-              <a:t>How much does it cost?</a:t>
-            </a:r>
-          </a:p>
-          <a:p>
-            <a:pPr marL="457200" indent="-457200">
-              <a:buFont typeface="Arial"/>
-              <a:buChar char="•"/>
-            </a:pPr>
-            <a:endParaRPr lang="en-US" dirty="0" smtClean="0"/>
-          </a:p>
-          <a:p>
-            <a:pPr marL="457200" indent="-457200">
-              <a:buFont typeface="Arial"/>
-              <a:buChar char="•"/>
-            </a:pPr>
-            <a:r>
-              <a:rPr lang="en-US" dirty="0" smtClean="0"/>
-              <a:t>How does my customer get it?</a:t>
-            </a:r>
-          </a:p>
-          <a:p>
-            <a:pPr marL="0" indent="0">
-              <a:buNone/>
-            </a:pPr>
-            <a:endParaRPr lang="en-US" dirty="0" smtClean="0"/>
-          </a:p>
-          <a:p>
-            <a:pPr marL="457200" indent="-457200">
-              <a:buFont typeface="Arial"/>
-              <a:buChar char="•"/>
-            </a:pPr>
-            <a:r>
-              <a:rPr lang="en-US" dirty="0" smtClean="0"/>
-              <a:t>Who do I contact for questions?</a:t>
-            </a:r>
-          </a:p>
-          <a:p>
-            <a:endParaRPr lang="en-US" dirty="0"/>
-          </a:p>
-        </p:txBody>
-      </p:sp>
-      <p:sp>
-        <p:nvSpPr>
-          <p:cNvPr id="4" name="Slide Number Placeholder 3"/>
-          <p:cNvSpPr>
-            <a:spLocks noGrp="1"/>
-          </p:cNvSpPr>
-          <p:nvPr>
-            <p:ph type="sldNum" sz="quarter" idx="10"/>
-          </p:nvPr>
-        </p:nvSpPr>
-        <p:spPr/>
-        <p:txBody>
-          <a:bodyPr/>
-          <a:lstStyle/>
-          <a:p>
-            <a:fld id="{A5E8145B-E57F-7042-809D-EFEA36287416}" type="slidenum">
-              <a:rPr lang="en-US" smtClean="0"/>
-              <a:pPr/>
-              <a:t>2</a:t>
             </a:fld>
             <a:endParaRPr lang="en-US" dirty="0"/>
           </a:p>
@@ -4072,15 +3866,52 @@
             <a:pPr lvl="1"/>
             <a:r>
               <a:rPr lang="en-US" dirty="0" smtClean="0"/>
-              <a:t>Collapse Business Services (</a:t>
-            </a:r>
-            <a:r>
-              <a:rPr lang="en-US" err="1" smtClean="0"/>
-              <a:t>DNSAdapter</a:t>
-            </a:r>
-            <a:r>
-              <a:rPr lang="en-US" smtClean="0"/>
-              <a:t>+DNSServiceImpl</a:t>
+              <a:t>Collapse Business </a:t>
+            </a:r>
+            <a:r>
+              <a:rPr lang="en-US" dirty="0" smtClean="0"/>
+              <a:t>Services</a:t>
+            </a:r>
+          </a:p>
+          <a:p>
+            <a:pPr lvl="2"/>
+            <a:r>
+              <a:rPr lang="en-US" dirty="0" smtClean="0"/>
+              <a:t>Reduce Adapter to simple SPI with no code</a:t>
+            </a:r>
+          </a:p>
+          <a:p>
+            <a:pPr lvl="2"/>
+            <a:r>
+              <a:rPr lang="en-US" dirty="0" smtClean="0"/>
+              <a:t>Consolidate code into service provider(s)</a:t>
+            </a:r>
+          </a:p>
+          <a:p>
+            <a:pPr lvl="2"/>
+            <a:r>
+              <a:rPr lang="en-US" dirty="0" smtClean="0"/>
+              <a:t>Better leverage OSGI service registry</a:t>
+            </a:r>
+            <a:endParaRPr lang="en-US" dirty="0" smtClean="0"/>
+          </a:p>
+          <a:p>
+            <a:pPr lvl="1"/>
+            <a:r>
+              <a:rPr lang="en-US" dirty="0" smtClean="0"/>
+              <a:t>Replace MySQL </a:t>
+            </a:r>
+            <a:r>
+              <a:rPr lang="en-US" dirty="0" smtClean="0"/>
+              <a:t>data store </a:t>
+            </a:r>
+            <a:r>
+              <a:rPr lang="en-US" dirty="0" smtClean="0"/>
+              <a:t>(with say </a:t>
+            </a:r>
+            <a:r>
+              <a:rPr lang="en-US" dirty="0" err="1" smtClean="0"/>
+              <a:t>Redis</a:t>
             </a:r>
             <a:r>
               <a:rPr lang="en-US" dirty="0" smtClean="0"/>
@@ -4088,45 +3919,24 @@
             </a:r>
           </a:p>
           <a:p>
-            <a:pPr lvl="1"/>
             <a:r>
               <a:rPr lang="en-US" dirty="0" smtClean="0"/>
-              <a:t>Replace MySQL </a:t>
-            </a:r>
-            <a:r>
-              <a:rPr lang="en-US" dirty="0" err="1" smtClean="0"/>
-              <a:t>datastore</a:t>
+              <a:t>PTR </a:t>
             </a:r>
             <a:r>
               <a:rPr lang="en-US" dirty="0" smtClean="0"/>
-              <a:t> (with say </a:t>
-            </a:r>
-            <a:r>
-              <a:rPr lang="en-US" dirty="0" err="1" smtClean="0"/>
-              <a:t>Redis</a:t>
-            </a:r>
-            <a:r>
-              <a:rPr lang="en-US" dirty="0" smtClean="0"/>
-              <a:t>)</a:t>
-            </a:r>
-          </a:p>
-          <a:p>
-            <a:r>
-              <a:rPr lang="en-US" dirty="0" smtClean="0"/>
-              <a:t>PTR Record Type Implementation</a:t>
-            </a:r>
-          </a:p>
-          <a:p>
-            <a:r>
-              <a:rPr lang="en-US" dirty="0" smtClean="0"/>
-              <a:t>Domain Registration Pass-through</a:t>
-            </a:r>
-            <a:endParaRPr lang="en-US" dirty="0"/>
-          </a:p>
-          <a:p>
-            <a:pPr marL="0" indent="0">
-              <a:buNone/>
-            </a:pPr>
+              <a:t>Record Type Implementation</a:t>
+            </a:r>
+          </a:p>
+          <a:p>
+            <a:r>
+              <a:rPr lang="en-US" smtClean="0"/>
+              <a:t>Domain </a:t>
+            </a:r>
+            <a:r>
+              <a:rPr lang="en-US" smtClean="0"/>
+              <a:t>Registration</a:t>
+            </a:r>
             <a:endParaRPr lang="en-US" dirty="0"/>
           </a:p>
           <a:p>
@@ -4196,126 +4006,6 @@
     <p:extLst>
       <p:ext uri="{BB962C8B-B14F-4D97-AF65-F5344CB8AC3E}">
         <p14:creationId xmlns:p14="http://schemas.microsoft.com/office/powerpoint/2010/main" val="302222980"/>
-      </p:ext>
-    </p:extLst>
-  </p:cSld>
-  <p:clrMapOvr>
-    <a:masterClrMapping/>
-  </p:clrMapOvr>
-  <p:transition xmlns:p14="http://schemas.microsoft.com/office/powerpoint/2010/main"/>
-  <p:timing>
-    <p:tnLst>
-      <p:par>
-        <p:cTn xmlns:p14="http://schemas.microsoft.com/office/powerpoint/2010/main" id="1" dur="indefinite" restart="never" nodeType="tmRoot"/>
-      </p:par>
-    </p:tnLst>
-  </p:timing>
-</p:sld>
-</file>
-
-<file path=ppt/slides/slide2.xml><?xml version="1.0" encoding="utf-8"?>
-<p:sld xmlns:a="http://schemas.openxmlformats.org/drawingml/2006/main" xmlns:r="http://schemas.openxmlformats.org/officeDocument/2006/relationships" xmlns:p="http://schemas.openxmlformats.org/presentationml/2006/main">
-  <p:cSld>
-    <p:spTree>
-      <p:nvGrpSpPr>
-        <p:cNvPr id="1" name=""/>
-        <p:cNvGrpSpPr/>
-        <p:nvPr/>
-      </p:nvGrpSpPr>
-      <p:grpSpPr>
-        <a:xfrm>
-          <a:off x="0" y="0"/>
-          <a:ext cx="0" cy="0"/>
-          <a:chOff x="0" y="0"/>
-          <a:chExt cx="0" cy="0"/>
-        </a:xfrm>
-      </p:grpSpPr>
-      <p:sp>
-        <p:nvSpPr>
-          <p:cNvPr id="2" name="Title 1"/>
-          <p:cNvSpPr>
-            <a:spLocks noGrp="1"/>
-          </p:cNvSpPr>
-          <p:nvPr>
-            <p:ph type="title"/>
-          </p:nvPr>
-        </p:nvSpPr>
-        <p:spPr/>
-        <p:txBody>
-          <a:bodyPr/>
-          <a:lstStyle/>
-          <a:p>
-            <a:r>
-              <a:rPr lang="en-US" dirty="0" smtClean="0"/>
-              <a:t>POSSIBLE FUTURE FEATURES (cont’d)</a:t>
-            </a:r>
-            <a:endParaRPr lang="en-US" dirty="0"/>
-          </a:p>
-        </p:txBody>
-      </p:sp>
-      <p:sp>
-        <p:nvSpPr>
-          <p:cNvPr id="3" name="Content Placeholder 2"/>
-          <p:cNvSpPr>
-            <a:spLocks noGrp="1"/>
-          </p:cNvSpPr>
-          <p:nvPr>
-            <p:ph idx="1"/>
-          </p:nvPr>
-        </p:nvSpPr>
-        <p:spPr/>
-        <p:txBody>
-          <a:bodyPr>
-            <a:normAutofit/>
-          </a:bodyPr>
-          <a:lstStyle/>
-          <a:p>
-            <a:pPr marL="0" indent="0">
-              <a:buNone/>
-            </a:pPr>
-            <a:endParaRPr lang="en-US" dirty="0"/>
-          </a:p>
-          <a:p>
-            <a:pPr marL="0" indent="0">
-              <a:buNone/>
-            </a:pPr>
-            <a:endParaRPr lang="en-US" dirty="0"/>
-          </a:p>
-        </p:txBody>
-      </p:sp>
-      <p:sp>
-        <p:nvSpPr>
-          <p:cNvPr id="4" name="Slide Number Placeholder 3"/>
-          <p:cNvSpPr>
-            <a:spLocks noGrp="1"/>
-          </p:cNvSpPr>
-          <p:nvPr>
-            <p:ph type="sldNum" sz="quarter" idx="10"/>
-          </p:nvPr>
-        </p:nvSpPr>
-        <p:spPr/>
-        <p:txBody>
-          <a:bodyPr/>
-          <a:lstStyle/>
-          <a:p>
-            <a:pPr>
-              <a:defRPr/>
-            </a:pPr>
-            <a:fld id="{884F1976-FC0F-224B-8A7A-A2BF98A1E361}" type="slidenum">
-              <a:rPr lang="en-US" smtClean="0"/>
-              <a:pPr>
-                <a:defRPr/>
-              </a:pPr>
-              <a:t>2</a:t>
-            </a:fld>
-            <a:endParaRPr lang="en-US" dirty="0"/>
-          </a:p>
-        </p:txBody>
-      </p:sp>
-    </p:spTree>
-    <p:extLst>
-      <p:ext uri="{BB962C8B-B14F-4D97-AF65-F5344CB8AC3E}">
-        <p14:creationId xmlns:p14="http://schemas.microsoft.com/office/powerpoint/2010/main" val="3280357688"/>
       </p:ext>
     </p:extLst>
   </p:cSld>

</xml_diff>